<commit_message>
Adding slide for CI/CD
</commit_message>
<xml_diff>
--- a/src/WebSite/wwwroot/slides/Docker Workshop.de.pptx
+++ b/src/WebSite/wwwroot/slides/Docker Workshop.de.pptx
@@ -18,6 +18,7 @@
     <p:sldId id="263" r:id="rId12"/>
     <p:sldId id="266" r:id="rId13"/>
     <p:sldId id="265" r:id="rId14"/>
+    <p:sldId id="270" r:id="rId15"/>
   </p:sldIdLst>
   <p:sldSz cx="12192000" cy="6858000"/>
   <p:notesSz cx="6858000" cy="9144000"/>
@@ -4124,6 +4125,1944 @@
 </p:sld>
 </file>
 
+<file path=ppt/slides/slide14.xml><?xml version="1.0" encoding="utf-8"?>
+<p:sld xmlns:a="http://schemas.openxmlformats.org/drawingml/2006/main" xmlns:r="http://schemas.openxmlformats.org/officeDocument/2006/relationships" xmlns:p="http://schemas.openxmlformats.org/presentationml/2006/main">
+  <p:cSld>
+    <p:spTree>
+      <p:nvGrpSpPr>
+        <p:cNvPr id="1" name=""/>
+        <p:cNvGrpSpPr/>
+        <p:nvPr/>
+      </p:nvGrpSpPr>
+      <p:grpSpPr>
+        <a:xfrm>
+          <a:off x="0" y="0"/>
+          <a:ext cx="0" cy="0"/>
+          <a:chOff x="0" y="0"/>
+          <a:chExt cx="0" cy="0"/>
+        </a:xfrm>
+      </p:grpSpPr>
+      <p:sp>
+        <p:nvSpPr>
+          <p:cNvPr id="2" name="Titel 1">
+            <a:extLst>
+              <a:ext uri="{FF2B5EF4-FFF2-40B4-BE49-F238E27FC236}">
+                <a16:creationId xmlns:a16="http://schemas.microsoft.com/office/drawing/2014/main" id="{96648B71-3AC4-47A9-B317-3EB7F13DB51C}"/>
+              </a:ext>
+            </a:extLst>
+          </p:cNvPr>
+          <p:cNvSpPr>
+            <a:spLocks noGrp="1"/>
+          </p:cNvSpPr>
+          <p:nvPr>
+            <p:ph type="title"/>
+          </p:nvPr>
+        </p:nvSpPr>
+        <p:spPr>
+          <a:xfrm>
+            <a:off x="838200" y="373146"/>
+            <a:ext cx="10515600" cy="1325563"/>
+          </a:xfrm>
+        </p:spPr>
+        <p:txBody>
+          <a:bodyPr/>
+          <a:lstStyle/>
+          <a:p>
+            <a:r>
+              <a:rPr lang="de-DE" dirty="0">
+                <a:solidFill>
+                  <a:schemeClr val="tx2"/>
+                </a:solidFill>
+              </a:rPr>
+              <a:t>Bespiel: CI/CD Pipeline</a:t>
+            </a:r>
+          </a:p>
+        </p:txBody>
+      </p:sp>
+      <p:sp>
+        <p:nvSpPr>
+          <p:cNvPr id="6" name="Rechteck 5">
+            <a:extLst>
+              <a:ext uri="{FF2B5EF4-FFF2-40B4-BE49-F238E27FC236}">
+                <a16:creationId xmlns:a16="http://schemas.microsoft.com/office/drawing/2014/main" id="{3DBDBC92-0224-4C2F-A6D7-17DADF05CE29}"/>
+              </a:ext>
+            </a:extLst>
+          </p:cNvPr>
+          <p:cNvSpPr/>
+          <p:nvPr/>
+        </p:nvSpPr>
+        <p:spPr>
+          <a:xfrm>
+            <a:off x="6732150" y="1828800"/>
+            <a:ext cx="2050903" cy="4684964"/>
+          </a:xfrm>
+          <a:prstGeom prst="rect">
+            <a:avLst/>
+          </a:prstGeom>
+        </p:spPr>
+        <p:style>
+          <a:lnRef idx="2">
+            <a:schemeClr val="accent5">
+              <a:shade val="50000"/>
+            </a:schemeClr>
+          </a:lnRef>
+          <a:fillRef idx="1">
+            <a:schemeClr val="accent5"/>
+          </a:fillRef>
+          <a:effectRef idx="0">
+            <a:schemeClr val="accent5"/>
+          </a:effectRef>
+          <a:fontRef idx="minor">
+            <a:schemeClr val="lt1"/>
+          </a:fontRef>
+        </p:style>
+        <p:txBody>
+          <a:bodyPr rtlCol="0" anchor="t"/>
+          <a:lstStyle/>
+          <a:p>
+            <a:pPr algn="ctr"/>
+            <a:r>
+              <a:rPr lang="de-DE" dirty="0"/>
+              <a:t>Azure </a:t>
+            </a:r>
+            <a:r>
+              <a:rPr lang="de-DE" dirty="0" err="1"/>
+              <a:t>Dev</a:t>
+            </a:r>
+            <a:r>
+              <a:rPr lang="de-DE" dirty="0"/>
+              <a:t> </a:t>
+            </a:r>
+            <a:r>
+              <a:rPr lang="de-DE" dirty="0" err="1"/>
+              <a:t>Ops</a:t>
+            </a:r>
+            <a:endParaRPr lang="de-DE" dirty="0"/>
+          </a:p>
+          <a:p>
+            <a:pPr algn="ctr"/>
+            <a:r>
+              <a:rPr lang="de-DE" dirty="0" err="1"/>
+              <a:t>Build</a:t>
+            </a:r>
+            <a:r>
+              <a:rPr lang="de-DE" dirty="0"/>
+              <a:t> Pipeline</a:t>
+            </a:r>
+          </a:p>
+          <a:p>
+            <a:pPr algn="ctr"/>
+            <a:r>
+              <a:rPr lang="de-DE" dirty="0"/>
+              <a:t>-</a:t>
+            </a:r>
+          </a:p>
+          <a:p>
+            <a:pPr algn="ctr"/>
+            <a:endParaRPr lang="de-DE" dirty="0"/>
+          </a:p>
+          <a:p>
+            <a:pPr algn="ctr"/>
+            <a:endParaRPr lang="de-DE" dirty="0"/>
+          </a:p>
+          <a:p>
+            <a:pPr algn="ctr"/>
+            <a:endParaRPr lang="de-DE" dirty="0"/>
+          </a:p>
+          <a:p>
+            <a:pPr algn="ctr"/>
+            <a:endParaRPr lang="de-DE" dirty="0"/>
+          </a:p>
+          <a:p>
+            <a:pPr algn="ctr"/>
+            <a:r>
+              <a:rPr lang="de-DE" dirty="0"/>
+              <a:t>CI </a:t>
+            </a:r>
+            <a:r>
+              <a:rPr lang="de-DE" dirty="0" err="1"/>
+              <a:t>build</a:t>
+            </a:r>
+            <a:r>
+              <a:rPr lang="de-DE" dirty="0"/>
+              <a:t> </a:t>
+            </a:r>
+            <a:r>
+              <a:rPr lang="de-DE" dirty="0" err="1"/>
+              <a:t>dev</a:t>
+            </a:r>
+            <a:endParaRPr lang="de-DE" dirty="0"/>
+          </a:p>
+          <a:p>
+            <a:pPr algn="ctr"/>
+            <a:endParaRPr lang="de-DE" dirty="0"/>
+          </a:p>
+          <a:p>
+            <a:pPr algn="ctr"/>
+            <a:endParaRPr lang="de-DE" dirty="0"/>
+          </a:p>
+          <a:p>
+            <a:pPr algn="ctr"/>
+            <a:endParaRPr lang="de-DE" dirty="0"/>
+          </a:p>
+          <a:p>
+            <a:pPr algn="ctr"/>
+            <a:endParaRPr lang="de-DE" dirty="0"/>
+          </a:p>
+          <a:p>
+            <a:pPr algn="ctr"/>
+            <a:r>
+              <a:rPr lang="de-DE" dirty="0"/>
+              <a:t>Release </a:t>
+            </a:r>
+            <a:r>
+              <a:rPr lang="de-DE" dirty="0" err="1"/>
+              <a:t>build</a:t>
+            </a:r>
+            <a:endParaRPr lang="de-DE" dirty="0"/>
+          </a:p>
+          <a:p>
+            <a:pPr algn="ctr"/>
+            <a:endParaRPr lang="de-DE" dirty="0"/>
+          </a:p>
+        </p:txBody>
+      </p:sp>
+      <p:sp>
+        <p:nvSpPr>
+          <p:cNvPr id="7" name="Rechteck 6">
+            <a:extLst>
+              <a:ext uri="{FF2B5EF4-FFF2-40B4-BE49-F238E27FC236}">
+                <a16:creationId xmlns:a16="http://schemas.microsoft.com/office/drawing/2014/main" id="{CF4A640A-D795-4DDB-9C17-B37ABDD47649}"/>
+              </a:ext>
+            </a:extLst>
+          </p:cNvPr>
+          <p:cNvSpPr/>
+          <p:nvPr/>
+        </p:nvSpPr>
+        <p:spPr>
+          <a:xfrm>
+            <a:off x="9390644" y="3824758"/>
+            <a:ext cx="2143627" cy="2689006"/>
+          </a:xfrm>
+          <a:prstGeom prst="rect">
+            <a:avLst/>
+          </a:prstGeom>
+        </p:spPr>
+        <p:style>
+          <a:lnRef idx="2">
+            <a:schemeClr val="accent5">
+              <a:shade val="50000"/>
+            </a:schemeClr>
+          </a:lnRef>
+          <a:fillRef idx="1">
+            <a:schemeClr val="accent5"/>
+          </a:fillRef>
+          <a:effectRef idx="0">
+            <a:schemeClr val="accent5"/>
+          </a:effectRef>
+          <a:fontRef idx="minor">
+            <a:schemeClr val="lt1"/>
+          </a:fontRef>
+        </p:style>
+        <p:txBody>
+          <a:bodyPr rtlCol="0" anchor="t"/>
+          <a:lstStyle/>
+          <a:p>
+            <a:pPr algn="ctr"/>
+            <a:r>
+              <a:rPr lang="de-DE" dirty="0"/>
+              <a:t>Registry</a:t>
+            </a:r>
+          </a:p>
+          <a:p>
+            <a:pPr algn="ctr"/>
+            <a:endParaRPr lang="de-DE" dirty="0"/>
+          </a:p>
+          <a:p>
+            <a:pPr algn="ctr"/>
+            <a:endParaRPr lang="de-DE" dirty="0"/>
+          </a:p>
+          <a:p>
+            <a:pPr algn="ctr"/>
+            <a:r>
+              <a:rPr lang="de-DE" dirty="0" err="1"/>
+              <a:t>linux-dev</a:t>
+            </a:r>
+            <a:endParaRPr lang="de-DE" dirty="0"/>
+          </a:p>
+          <a:p>
+            <a:pPr algn="ctr"/>
+            <a:endParaRPr lang="de-DE" dirty="0"/>
+          </a:p>
+          <a:p>
+            <a:pPr algn="ctr"/>
+            <a:endParaRPr lang="de-DE" dirty="0"/>
+          </a:p>
+          <a:p>
+            <a:pPr algn="ctr"/>
+            <a:endParaRPr lang="de-DE" dirty="0"/>
+          </a:p>
+          <a:p>
+            <a:pPr algn="ctr"/>
+            <a:r>
+              <a:rPr lang="de-DE" dirty="0" err="1"/>
+              <a:t>linux</a:t>
+            </a:r>
+            <a:r>
+              <a:rPr lang="de-DE" dirty="0"/>
+              <a:t>-master</a:t>
+            </a:r>
+          </a:p>
+          <a:p>
+            <a:pPr algn="ctr"/>
+            <a:r>
+              <a:rPr lang="de-DE" dirty="0" err="1"/>
+              <a:t>latest</a:t>
+            </a:r>
+            <a:endParaRPr lang="de-DE" dirty="0"/>
+          </a:p>
+        </p:txBody>
+      </p:sp>
+      <p:sp>
+        <p:nvSpPr>
+          <p:cNvPr id="11" name="Rechteck 10">
+            <a:extLst>
+              <a:ext uri="{FF2B5EF4-FFF2-40B4-BE49-F238E27FC236}">
+                <a16:creationId xmlns:a16="http://schemas.microsoft.com/office/drawing/2014/main" id="{ECF58507-7687-4F57-9C5B-DC31CEE02698}"/>
+              </a:ext>
+            </a:extLst>
+          </p:cNvPr>
+          <p:cNvSpPr/>
+          <p:nvPr/>
+        </p:nvSpPr>
+        <p:spPr>
+          <a:xfrm>
+            <a:off x="920416" y="1897344"/>
+            <a:ext cx="2015289" cy="4587509"/>
+          </a:xfrm>
+          <a:prstGeom prst="rect">
+            <a:avLst/>
+          </a:prstGeom>
+        </p:spPr>
+        <p:style>
+          <a:lnRef idx="2">
+            <a:schemeClr val="accent5">
+              <a:shade val="50000"/>
+            </a:schemeClr>
+          </a:lnRef>
+          <a:fillRef idx="1">
+            <a:schemeClr val="accent5"/>
+          </a:fillRef>
+          <a:effectRef idx="0">
+            <a:schemeClr val="accent5"/>
+          </a:effectRef>
+          <a:fontRef idx="minor">
+            <a:schemeClr val="lt1"/>
+          </a:fontRef>
+        </p:style>
+        <p:txBody>
+          <a:bodyPr rtlCol="0" anchor="t"/>
+          <a:lstStyle/>
+          <a:p>
+            <a:pPr algn="ctr"/>
+            <a:r>
+              <a:rPr lang="de-DE" dirty="0"/>
+              <a:t>Entwickler-PC</a:t>
+            </a:r>
+          </a:p>
+          <a:p>
+            <a:pPr algn="ctr"/>
+            <a:endParaRPr lang="de-DE" dirty="0"/>
+          </a:p>
+          <a:p>
+            <a:pPr marL="285750" indent="-285750" algn="ctr">
+              <a:buFontTx/>
+              <a:buChar char="-"/>
+            </a:pPr>
+            <a:r>
+              <a:rPr lang="de-DE" dirty="0"/>
+              <a:t>- Entwickelt jedes PBI auf eigenen Feature-Branch</a:t>
+            </a:r>
+          </a:p>
+          <a:p>
+            <a:pPr marL="285750" indent="-285750" algn="ctr">
+              <a:buFontTx/>
+              <a:buChar char="-"/>
+            </a:pPr>
+            <a:r>
+              <a:rPr lang="de-DE" dirty="0"/>
+              <a:t>Bauen der Images lokal</a:t>
+            </a:r>
+          </a:p>
+          <a:p>
+            <a:pPr marL="285750" indent="-285750" algn="ctr">
+              <a:buFontTx/>
+              <a:buChar char="-"/>
+            </a:pPr>
+            <a:endParaRPr lang="de-DE" dirty="0"/>
+          </a:p>
+          <a:p>
+            <a:pPr marL="285750" indent="-285750" algn="ctr">
+              <a:buFontTx/>
+              <a:buChar char="-"/>
+            </a:pPr>
+            <a:endParaRPr lang="de-DE" dirty="0"/>
+          </a:p>
+          <a:p>
+            <a:pPr marL="285750" indent="-285750" algn="ctr">
+              <a:buFontTx/>
+              <a:buChar char="-"/>
+            </a:pPr>
+            <a:endParaRPr lang="de-DE" dirty="0"/>
+          </a:p>
+          <a:p>
+            <a:pPr marL="285750" indent="-285750" algn="ctr">
+              <a:buFontTx/>
+              <a:buChar char="-"/>
+            </a:pPr>
+            <a:r>
+              <a:rPr lang="de-DE" dirty="0" err="1"/>
+              <a:t>Autom</a:t>
+            </a:r>
+            <a:r>
+              <a:rPr lang="de-DE" dirty="0"/>
+              <a:t>. Testläufe</a:t>
+            </a:r>
+          </a:p>
+          <a:p>
+            <a:pPr marL="285750" indent="-285750" algn="ctr">
+              <a:buFontTx/>
+              <a:buChar char="-"/>
+            </a:pPr>
+            <a:r>
+              <a:rPr lang="de-DE" dirty="0"/>
+              <a:t>Sonstige </a:t>
+            </a:r>
+            <a:r>
+              <a:rPr lang="de-DE" dirty="0" err="1"/>
+              <a:t>Integrationstes</a:t>
+            </a:r>
+            <a:endParaRPr lang="de-DE" dirty="0"/>
+          </a:p>
+          <a:p>
+            <a:pPr algn="ctr"/>
+            <a:r>
+              <a:rPr lang="de-DE" dirty="0"/>
+              <a:t>	(gegen </a:t>
+            </a:r>
+            <a:r>
+              <a:rPr lang="de-DE" dirty="0" err="1"/>
+              <a:t>dev</a:t>
+            </a:r>
+            <a:r>
+              <a:rPr lang="de-DE" dirty="0"/>
+              <a:t>)</a:t>
+            </a:r>
+          </a:p>
+        </p:txBody>
+      </p:sp>
+      <p:grpSp>
+        <p:nvGrpSpPr>
+          <p:cNvPr id="33" name="Gruppieren 32">
+            <a:extLst>
+              <a:ext uri="{FF2B5EF4-FFF2-40B4-BE49-F238E27FC236}">
+                <a16:creationId xmlns:a16="http://schemas.microsoft.com/office/drawing/2014/main" id="{F6D42A3C-668B-4732-94DA-28B9DC7F6728}"/>
+              </a:ext>
+            </a:extLst>
+          </p:cNvPr>
+          <p:cNvGrpSpPr/>
+          <p:nvPr/>
+        </p:nvGrpSpPr>
+        <p:grpSpPr>
+          <a:xfrm>
+            <a:off x="7380960" y="5568088"/>
+            <a:ext cx="637333" cy="478943"/>
+            <a:chOff x="1985551" y="5904513"/>
+            <a:chExt cx="637333" cy="478943"/>
+          </a:xfrm>
+        </p:grpSpPr>
+        <p:sp>
+          <p:nvSpPr>
+            <p:cNvPr id="30" name="Würfel 29">
+              <a:extLst>
+                <a:ext uri="{FF2B5EF4-FFF2-40B4-BE49-F238E27FC236}">
+                  <a16:creationId xmlns:a16="http://schemas.microsoft.com/office/drawing/2014/main" id="{B27BE85D-1719-4123-A6A1-B1CACC1B917D}"/>
+                </a:ext>
+              </a:extLst>
+            </p:cNvPr>
+            <p:cNvSpPr/>
+            <p:nvPr/>
+          </p:nvSpPr>
+          <p:spPr>
+            <a:xfrm>
+              <a:off x="1985551" y="6104021"/>
+              <a:ext cx="637333" cy="279435"/>
+            </a:xfrm>
+            <a:prstGeom prst="cube">
+              <a:avLst>
+                <a:gd name="adj" fmla="val 78110"/>
+              </a:avLst>
+            </a:prstGeom>
+          </p:spPr>
+          <p:style>
+            <a:lnRef idx="3">
+              <a:schemeClr val="lt1"/>
+            </a:lnRef>
+            <a:fillRef idx="1">
+              <a:schemeClr val="accent6"/>
+            </a:fillRef>
+            <a:effectRef idx="1">
+              <a:schemeClr val="accent6"/>
+            </a:effectRef>
+            <a:fontRef idx="minor">
+              <a:schemeClr val="lt1"/>
+            </a:fontRef>
+          </p:style>
+          <p:txBody>
+            <a:bodyPr rtlCol="0" anchor="ctr"/>
+            <a:lstStyle/>
+            <a:p>
+              <a:pPr algn="ctr"/>
+              <a:endParaRPr lang="de-DE"/>
+            </a:p>
+          </p:txBody>
+        </p:sp>
+        <p:sp>
+          <p:nvSpPr>
+            <p:cNvPr id="31" name="Würfel 30">
+              <a:extLst>
+                <a:ext uri="{FF2B5EF4-FFF2-40B4-BE49-F238E27FC236}">
+                  <a16:creationId xmlns:a16="http://schemas.microsoft.com/office/drawing/2014/main" id="{0A33293A-A199-4875-ABBB-D261A2159CD9}"/>
+                </a:ext>
+              </a:extLst>
+            </p:cNvPr>
+            <p:cNvSpPr/>
+            <p:nvPr/>
+          </p:nvSpPr>
+          <p:spPr>
+            <a:xfrm>
+              <a:off x="1985551" y="6004267"/>
+              <a:ext cx="637333" cy="279435"/>
+            </a:xfrm>
+            <a:prstGeom prst="cube">
+              <a:avLst>
+                <a:gd name="adj" fmla="val 78110"/>
+              </a:avLst>
+            </a:prstGeom>
+          </p:spPr>
+          <p:style>
+            <a:lnRef idx="3">
+              <a:schemeClr val="lt1"/>
+            </a:lnRef>
+            <a:fillRef idx="1">
+              <a:schemeClr val="accent6"/>
+            </a:fillRef>
+            <a:effectRef idx="1">
+              <a:schemeClr val="accent6"/>
+            </a:effectRef>
+            <a:fontRef idx="minor">
+              <a:schemeClr val="lt1"/>
+            </a:fontRef>
+          </p:style>
+          <p:txBody>
+            <a:bodyPr rtlCol="0" anchor="ctr"/>
+            <a:lstStyle/>
+            <a:p>
+              <a:pPr algn="ctr"/>
+              <a:endParaRPr lang="de-DE" dirty="0"/>
+            </a:p>
+          </p:txBody>
+        </p:sp>
+        <p:sp>
+          <p:nvSpPr>
+            <p:cNvPr id="32" name="Würfel 31">
+              <a:extLst>
+                <a:ext uri="{FF2B5EF4-FFF2-40B4-BE49-F238E27FC236}">
+                  <a16:creationId xmlns:a16="http://schemas.microsoft.com/office/drawing/2014/main" id="{C84A1ECA-A37C-4070-9486-CFA677703A6A}"/>
+                </a:ext>
+              </a:extLst>
+            </p:cNvPr>
+            <p:cNvSpPr/>
+            <p:nvPr/>
+          </p:nvSpPr>
+          <p:spPr>
+            <a:xfrm>
+              <a:off x="1985551" y="5904513"/>
+              <a:ext cx="637333" cy="279435"/>
+            </a:xfrm>
+            <a:prstGeom prst="cube">
+              <a:avLst>
+                <a:gd name="adj" fmla="val 78110"/>
+              </a:avLst>
+            </a:prstGeom>
+          </p:spPr>
+          <p:style>
+            <a:lnRef idx="3">
+              <a:schemeClr val="lt1"/>
+            </a:lnRef>
+            <a:fillRef idx="1">
+              <a:schemeClr val="accent6"/>
+            </a:fillRef>
+            <a:effectRef idx="1">
+              <a:schemeClr val="accent6"/>
+            </a:effectRef>
+            <a:fontRef idx="minor">
+              <a:schemeClr val="lt1"/>
+            </a:fontRef>
+          </p:style>
+          <p:txBody>
+            <a:bodyPr rtlCol="0" anchor="ctr"/>
+            <a:lstStyle/>
+            <a:p>
+              <a:pPr algn="ctr"/>
+              <a:endParaRPr lang="de-DE"/>
+            </a:p>
+          </p:txBody>
+        </p:sp>
+      </p:grpSp>
+      <p:grpSp>
+        <p:nvGrpSpPr>
+          <p:cNvPr id="34" name="Gruppieren 33">
+            <a:extLst>
+              <a:ext uri="{FF2B5EF4-FFF2-40B4-BE49-F238E27FC236}">
+                <a16:creationId xmlns:a16="http://schemas.microsoft.com/office/drawing/2014/main" id="{6D1F02A7-B1E1-43A5-88DE-B0C6868B0DC1}"/>
+              </a:ext>
+            </a:extLst>
+          </p:cNvPr>
+          <p:cNvGrpSpPr/>
+          <p:nvPr/>
+        </p:nvGrpSpPr>
+        <p:grpSpPr>
+          <a:xfrm>
+            <a:off x="1678575" y="4286231"/>
+            <a:ext cx="637333" cy="478943"/>
+            <a:chOff x="1985551" y="5904513"/>
+            <a:chExt cx="637333" cy="478943"/>
+          </a:xfrm>
+        </p:grpSpPr>
+        <p:sp>
+          <p:nvSpPr>
+            <p:cNvPr id="35" name="Würfel 34">
+              <a:extLst>
+                <a:ext uri="{FF2B5EF4-FFF2-40B4-BE49-F238E27FC236}">
+                  <a16:creationId xmlns:a16="http://schemas.microsoft.com/office/drawing/2014/main" id="{9A807677-694E-48CD-BED9-E45B62CDD91D}"/>
+                </a:ext>
+              </a:extLst>
+            </p:cNvPr>
+            <p:cNvSpPr/>
+            <p:nvPr/>
+          </p:nvSpPr>
+          <p:spPr>
+            <a:xfrm>
+              <a:off x="1985551" y="6104021"/>
+              <a:ext cx="637333" cy="279435"/>
+            </a:xfrm>
+            <a:prstGeom prst="cube">
+              <a:avLst>
+                <a:gd name="adj" fmla="val 78110"/>
+              </a:avLst>
+            </a:prstGeom>
+          </p:spPr>
+          <p:style>
+            <a:lnRef idx="3">
+              <a:schemeClr val="lt1"/>
+            </a:lnRef>
+            <a:fillRef idx="1">
+              <a:schemeClr val="accent6"/>
+            </a:fillRef>
+            <a:effectRef idx="1">
+              <a:schemeClr val="accent6"/>
+            </a:effectRef>
+            <a:fontRef idx="minor">
+              <a:schemeClr val="lt1"/>
+            </a:fontRef>
+          </p:style>
+          <p:txBody>
+            <a:bodyPr rtlCol="0" anchor="ctr"/>
+            <a:lstStyle/>
+            <a:p>
+              <a:pPr algn="ctr"/>
+              <a:endParaRPr lang="de-DE"/>
+            </a:p>
+          </p:txBody>
+        </p:sp>
+        <p:sp>
+          <p:nvSpPr>
+            <p:cNvPr id="36" name="Würfel 35">
+              <a:extLst>
+                <a:ext uri="{FF2B5EF4-FFF2-40B4-BE49-F238E27FC236}">
+                  <a16:creationId xmlns:a16="http://schemas.microsoft.com/office/drawing/2014/main" id="{29A9BB44-CC0B-4018-BF4E-CC9120F4488A}"/>
+                </a:ext>
+              </a:extLst>
+            </p:cNvPr>
+            <p:cNvSpPr/>
+            <p:nvPr/>
+          </p:nvSpPr>
+          <p:spPr>
+            <a:xfrm>
+              <a:off x="1985551" y="6004267"/>
+              <a:ext cx="637333" cy="279435"/>
+            </a:xfrm>
+            <a:prstGeom prst="cube">
+              <a:avLst>
+                <a:gd name="adj" fmla="val 78110"/>
+              </a:avLst>
+            </a:prstGeom>
+          </p:spPr>
+          <p:style>
+            <a:lnRef idx="3">
+              <a:schemeClr val="lt1"/>
+            </a:lnRef>
+            <a:fillRef idx="1">
+              <a:schemeClr val="accent6"/>
+            </a:fillRef>
+            <a:effectRef idx="1">
+              <a:schemeClr val="accent6"/>
+            </a:effectRef>
+            <a:fontRef idx="minor">
+              <a:schemeClr val="lt1"/>
+            </a:fontRef>
+          </p:style>
+          <p:txBody>
+            <a:bodyPr rtlCol="0" anchor="ctr"/>
+            <a:lstStyle/>
+            <a:p>
+              <a:pPr algn="ctr"/>
+              <a:endParaRPr lang="de-DE"/>
+            </a:p>
+          </p:txBody>
+        </p:sp>
+        <p:sp>
+          <p:nvSpPr>
+            <p:cNvPr id="37" name="Würfel 36">
+              <a:extLst>
+                <a:ext uri="{FF2B5EF4-FFF2-40B4-BE49-F238E27FC236}">
+                  <a16:creationId xmlns:a16="http://schemas.microsoft.com/office/drawing/2014/main" id="{01F04CAE-8B6E-4D84-A37A-11CEFF524A25}"/>
+                </a:ext>
+              </a:extLst>
+            </p:cNvPr>
+            <p:cNvSpPr/>
+            <p:nvPr/>
+          </p:nvSpPr>
+          <p:spPr>
+            <a:xfrm>
+              <a:off x="1985551" y="5904513"/>
+              <a:ext cx="637333" cy="279435"/>
+            </a:xfrm>
+            <a:prstGeom prst="cube">
+              <a:avLst>
+                <a:gd name="adj" fmla="val 78110"/>
+              </a:avLst>
+            </a:prstGeom>
+          </p:spPr>
+          <p:style>
+            <a:lnRef idx="3">
+              <a:schemeClr val="lt1"/>
+            </a:lnRef>
+            <a:fillRef idx="1">
+              <a:schemeClr val="accent6"/>
+            </a:fillRef>
+            <a:effectRef idx="1">
+              <a:schemeClr val="accent6"/>
+            </a:effectRef>
+            <a:fontRef idx="minor">
+              <a:schemeClr val="lt1"/>
+            </a:fontRef>
+          </p:style>
+          <p:txBody>
+            <a:bodyPr rtlCol="0" anchor="ctr"/>
+            <a:lstStyle/>
+            <a:p>
+              <a:pPr algn="ctr"/>
+              <a:endParaRPr lang="de-DE"/>
+            </a:p>
+          </p:txBody>
+        </p:sp>
+      </p:grpSp>
+      <p:sp>
+        <p:nvSpPr>
+          <p:cNvPr id="29" name="Rechteck 28">
+            <a:extLst>
+              <a:ext uri="{FF2B5EF4-FFF2-40B4-BE49-F238E27FC236}">
+                <a16:creationId xmlns:a16="http://schemas.microsoft.com/office/drawing/2014/main" id="{D053B458-C43F-4EFD-B48D-88CCDA8EEEE5}"/>
+              </a:ext>
+            </a:extLst>
+          </p:cNvPr>
+          <p:cNvSpPr/>
+          <p:nvPr/>
+        </p:nvSpPr>
+        <p:spPr>
+          <a:xfrm>
+            <a:off x="4093644" y="1828801"/>
+            <a:ext cx="1880937" cy="4684964"/>
+          </a:xfrm>
+          <a:prstGeom prst="rect">
+            <a:avLst/>
+          </a:prstGeom>
+        </p:spPr>
+        <p:style>
+          <a:lnRef idx="2">
+            <a:schemeClr val="accent5">
+              <a:shade val="50000"/>
+            </a:schemeClr>
+          </a:lnRef>
+          <a:fillRef idx="1">
+            <a:schemeClr val="accent5"/>
+          </a:fillRef>
+          <a:effectRef idx="0">
+            <a:schemeClr val="accent5"/>
+          </a:effectRef>
+          <a:fontRef idx="minor">
+            <a:schemeClr val="lt1"/>
+          </a:fontRef>
+        </p:style>
+        <p:txBody>
+          <a:bodyPr rtlCol="0" anchor="t"/>
+          <a:lstStyle/>
+          <a:p>
+            <a:pPr algn="ctr"/>
+            <a:r>
+              <a:rPr lang="de-DE" dirty="0"/>
+              <a:t>Quellcode</a:t>
+            </a:r>
+          </a:p>
+          <a:p>
+            <a:pPr algn="ctr"/>
+            <a:r>
+              <a:rPr lang="de-DE" dirty="0"/>
+              <a:t>Repository</a:t>
+            </a:r>
+          </a:p>
+        </p:txBody>
+      </p:sp>
+      <p:sp>
+        <p:nvSpPr>
+          <p:cNvPr id="41" name="Zylinder 40">
+            <a:extLst>
+              <a:ext uri="{FF2B5EF4-FFF2-40B4-BE49-F238E27FC236}">
+                <a16:creationId xmlns:a16="http://schemas.microsoft.com/office/drawing/2014/main" id="{EB16C4CF-F74B-4C8B-B891-C4134D4D3F4B}"/>
+              </a:ext>
+            </a:extLst>
+          </p:cNvPr>
+          <p:cNvSpPr/>
+          <p:nvPr/>
+        </p:nvSpPr>
+        <p:spPr>
+          <a:xfrm>
+            <a:off x="4326761" y="3605589"/>
+            <a:ext cx="1405213" cy="2594828"/>
+          </a:xfrm>
+          <a:prstGeom prst="can">
+            <a:avLst/>
+          </a:prstGeom>
+        </p:spPr>
+        <p:style>
+          <a:lnRef idx="2">
+            <a:schemeClr val="accent1">
+              <a:shade val="50000"/>
+            </a:schemeClr>
+          </a:lnRef>
+          <a:fillRef idx="1">
+            <a:schemeClr val="accent1"/>
+          </a:fillRef>
+          <a:effectRef idx="0">
+            <a:schemeClr val="accent1"/>
+          </a:effectRef>
+          <a:fontRef idx="minor">
+            <a:schemeClr val="lt1"/>
+          </a:fontRef>
+        </p:style>
+        <p:txBody>
+          <a:bodyPr rtlCol="0" anchor="ctr"/>
+          <a:lstStyle/>
+          <a:p>
+            <a:pPr algn="ctr"/>
+            <a:r>
+              <a:rPr lang="de-DE" dirty="0" err="1"/>
+              <a:t>git</a:t>
+            </a:r>
+            <a:endParaRPr lang="de-DE" dirty="0"/>
+          </a:p>
+        </p:txBody>
+      </p:sp>
+      <p:sp>
+        <p:nvSpPr>
+          <p:cNvPr id="3" name="Pfeil: nach rechts 2">
+            <a:extLst>
+              <a:ext uri="{FF2B5EF4-FFF2-40B4-BE49-F238E27FC236}">
+                <a16:creationId xmlns:a16="http://schemas.microsoft.com/office/drawing/2014/main" id="{1E117053-664C-4169-8BFE-6474D743F4A4}"/>
+              </a:ext>
+            </a:extLst>
+          </p:cNvPr>
+          <p:cNvSpPr/>
+          <p:nvPr/>
+        </p:nvSpPr>
+        <p:spPr>
+          <a:xfrm>
+            <a:off x="2885256" y="3805097"/>
+            <a:ext cx="1367871" cy="895633"/>
+          </a:xfrm>
+          <a:prstGeom prst="rightArrow">
+            <a:avLst/>
+          </a:prstGeom>
+        </p:spPr>
+        <p:style>
+          <a:lnRef idx="2">
+            <a:schemeClr val="accent1">
+              <a:shade val="50000"/>
+            </a:schemeClr>
+          </a:lnRef>
+          <a:fillRef idx="1">
+            <a:schemeClr val="accent1"/>
+          </a:fillRef>
+          <a:effectRef idx="0">
+            <a:schemeClr val="accent1"/>
+          </a:effectRef>
+          <a:fontRef idx="minor">
+            <a:schemeClr val="lt1"/>
+          </a:fontRef>
+        </p:style>
+        <p:txBody>
+          <a:bodyPr rtlCol="0" anchor="ctr"/>
+          <a:lstStyle/>
+          <a:p>
+            <a:pPr algn="ctr"/>
+            <a:r>
+              <a:rPr lang="de-DE" dirty="0"/>
+              <a:t>push </a:t>
+            </a:r>
+            <a:r>
+              <a:rPr lang="de-DE" dirty="0" err="1"/>
+              <a:t>to</a:t>
+            </a:r>
+            <a:r>
+              <a:rPr lang="de-DE" dirty="0"/>
+              <a:t> </a:t>
+            </a:r>
+            <a:r>
+              <a:rPr lang="de-DE" dirty="0" err="1"/>
+              <a:t>dev</a:t>
+            </a:r>
+            <a:endParaRPr lang="de-DE" dirty="0"/>
+          </a:p>
+        </p:txBody>
+      </p:sp>
+      <p:sp>
+        <p:nvSpPr>
+          <p:cNvPr id="4" name="Gewitterblitz 3">
+            <a:extLst>
+              <a:ext uri="{FF2B5EF4-FFF2-40B4-BE49-F238E27FC236}">
+                <a16:creationId xmlns:a16="http://schemas.microsoft.com/office/drawing/2014/main" id="{1031F137-0411-40AD-B43C-59BE04C5AE9D}"/>
+              </a:ext>
+            </a:extLst>
+          </p:cNvPr>
+          <p:cNvSpPr/>
+          <p:nvPr/>
+        </p:nvSpPr>
+        <p:spPr>
+          <a:xfrm rot="7333893">
+            <a:off x="5880223" y="5355140"/>
+            <a:ext cx="914400" cy="914400"/>
+          </a:xfrm>
+          <a:prstGeom prst="lightningBolt">
+            <a:avLst/>
+          </a:prstGeom>
+        </p:spPr>
+        <p:style>
+          <a:lnRef idx="2">
+            <a:schemeClr val="accent1">
+              <a:shade val="50000"/>
+            </a:schemeClr>
+          </a:lnRef>
+          <a:fillRef idx="1">
+            <a:schemeClr val="accent1"/>
+          </a:fillRef>
+          <a:effectRef idx="0">
+            <a:schemeClr val="accent1"/>
+          </a:effectRef>
+          <a:fontRef idx="minor">
+            <a:schemeClr val="lt1"/>
+          </a:fontRef>
+        </p:style>
+        <p:txBody>
+          <a:bodyPr rtlCol="0" anchor="ctr"/>
+          <a:lstStyle/>
+          <a:p>
+            <a:pPr algn="ctr"/>
+            <a:endParaRPr lang="de-DE" dirty="0"/>
+          </a:p>
+        </p:txBody>
+      </p:sp>
+      <p:sp>
+        <p:nvSpPr>
+          <p:cNvPr id="43" name="Pfeil: nach rechts 42">
+            <a:extLst>
+              <a:ext uri="{FF2B5EF4-FFF2-40B4-BE49-F238E27FC236}">
+                <a16:creationId xmlns:a16="http://schemas.microsoft.com/office/drawing/2014/main" id="{D13167D3-3F20-4E04-A9CB-B439D6396FF1}"/>
+              </a:ext>
+            </a:extLst>
+          </p:cNvPr>
+          <p:cNvSpPr/>
+          <p:nvPr/>
+        </p:nvSpPr>
+        <p:spPr>
+          <a:xfrm>
+            <a:off x="8378592" y="5620294"/>
+            <a:ext cx="1367871" cy="280852"/>
+          </a:xfrm>
+          <a:prstGeom prst="rightArrow">
+            <a:avLst/>
+          </a:prstGeom>
+        </p:spPr>
+        <p:style>
+          <a:lnRef idx="2">
+            <a:schemeClr val="accent1">
+              <a:shade val="50000"/>
+            </a:schemeClr>
+          </a:lnRef>
+          <a:fillRef idx="1">
+            <a:schemeClr val="accent1"/>
+          </a:fillRef>
+          <a:effectRef idx="0">
+            <a:schemeClr val="accent1"/>
+          </a:effectRef>
+          <a:fontRef idx="minor">
+            <a:schemeClr val="lt1"/>
+          </a:fontRef>
+        </p:style>
+        <p:txBody>
+          <a:bodyPr rtlCol="0" anchor="ctr"/>
+          <a:lstStyle/>
+          <a:p>
+            <a:pPr algn="ctr"/>
+            <a:endParaRPr lang="de-DE" dirty="0"/>
+          </a:p>
+        </p:txBody>
+      </p:sp>
+      <p:grpSp>
+        <p:nvGrpSpPr>
+          <p:cNvPr id="45" name="Gruppieren 44">
+            <a:extLst>
+              <a:ext uri="{FF2B5EF4-FFF2-40B4-BE49-F238E27FC236}">
+                <a16:creationId xmlns:a16="http://schemas.microsoft.com/office/drawing/2014/main" id="{3E3806DC-972A-45C6-AC5F-8F46EBDBDC48}"/>
+              </a:ext>
+            </a:extLst>
+          </p:cNvPr>
+          <p:cNvGrpSpPr/>
+          <p:nvPr/>
+        </p:nvGrpSpPr>
+        <p:grpSpPr>
+          <a:xfrm>
+            <a:off x="10132118" y="4186476"/>
+            <a:ext cx="637333" cy="478943"/>
+            <a:chOff x="1985551" y="5904513"/>
+            <a:chExt cx="637333" cy="478943"/>
+          </a:xfrm>
+        </p:grpSpPr>
+        <p:sp>
+          <p:nvSpPr>
+            <p:cNvPr id="46" name="Würfel 45">
+              <a:extLst>
+                <a:ext uri="{FF2B5EF4-FFF2-40B4-BE49-F238E27FC236}">
+                  <a16:creationId xmlns:a16="http://schemas.microsoft.com/office/drawing/2014/main" id="{97E4543B-C3B9-4716-B593-CEA09A2EB295}"/>
+                </a:ext>
+              </a:extLst>
+            </p:cNvPr>
+            <p:cNvSpPr/>
+            <p:nvPr/>
+          </p:nvSpPr>
+          <p:spPr>
+            <a:xfrm>
+              <a:off x="1985551" y="6104021"/>
+              <a:ext cx="637333" cy="279435"/>
+            </a:xfrm>
+            <a:prstGeom prst="cube">
+              <a:avLst>
+                <a:gd name="adj" fmla="val 78110"/>
+              </a:avLst>
+            </a:prstGeom>
+          </p:spPr>
+          <p:style>
+            <a:lnRef idx="3">
+              <a:schemeClr val="lt1"/>
+            </a:lnRef>
+            <a:fillRef idx="1">
+              <a:schemeClr val="accent6"/>
+            </a:fillRef>
+            <a:effectRef idx="1">
+              <a:schemeClr val="accent6"/>
+            </a:effectRef>
+            <a:fontRef idx="minor">
+              <a:schemeClr val="lt1"/>
+            </a:fontRef>
+          </p:style>
+          <p:txBody>
+            <a:bodyPr rtlCol="0" anchor="ctr"/>
+            <a:lstStyle/>
+            <a:p>
+              <a:pPr algn="ctr"/>
+              <a:endParaRPr lang="de-DE"/>
+            </a:p>
+          </p:txBody>
+        </p:sp>
+        <p:sp>
+          <p:nvSpPr>
+            <p:cNvPr id="47" name="Würfel 46">
+              <a:extLst>
+                <a:ext uri="{FF2B5EF4-FFF2-40B4-BE49-F238E27FC236}">
+                  <a16:creationId xmlns:a16="http://schemas.microsoft.com/office/drawing/2014/main" id="{A85A8DFD-4833-461E-AE1E-62256FDCA880}"/>
+                </a:ext>
+              </a:extLst>
+            </p:cNvPr>
+            <p:cNvSpPr/>
+            <p:nvPr/>
+          </p:nvSpPr>
+          <p:spPr>
+            <a:xfrm>
+              <a:off x="1985551" y="6004267"/>
+              <a:ext cx="637333" cy="279435"/>
+            </a:xfrm>
+            <a:prstGeom prst="cube">
+              <a:avLst>
+                <a:gd name="adj" fmla="val 78110"/>
+              </a:avLst>
+            </a:prstGeom>
+          </p:spPr>
+          <p:style>
+            <a:lnRef idx="3">
+              <a:schemeClr val="lt1"/>
+            </a:lnRef>
+            <a:fillRef idx="1">
+              <a:schemeClr val="accent6"/>
+            </a:fillRef>
+            <a:effectRef idx="1">
+              <a:schemeClr val="accent6"/>
+            </a:effectRef>
+            <a:fontRef idx="minor">
+              <a:schemeClr val="lt1"/>
+            </a:fontRef>
+          </p:style>
+          <p:txBody>
+            <a:bodyPr rtlCol="0" anchor="ctr"/>
+            <a:lstStyle/>
+            <a:p>
+              <a:pPr algn="ctr"/>
+              <a:endParaRPr lang="de-DE"/>
+            </a:p>
+          </p:txBody>
+        </p:sp>
+        <p:sp>
+          <p:nvSpPr>
+            <p:cNvPr id="48" name="Würfel 47">
+              <a:extLst>
+                <a:ext uri="{FF2B5EF4-FFF2-40B4-BE49-F238E27FC236}">
+                  <a16:creationId xmlns:a16="http://schemas.microsoft.com/office/drawing/2014/main" id="{289438D1-A5F6-4291-8F5B-D156AE7B4E42}"/>
+                </a:ext>
+              </a:extLst>
+            </p:cNvPr>
+            <p:cNvSpPr/>
+            <p:nvPr/>
+          </p:nvSpPr>
+          <p:spPr>
+            <a:xfrm>
+              <a:off x="1985551" y="5904513"/>
+              <a:ext cx="637333" cy="279435"/>
+            </a:xfrm>
+            <a:prstGeom prst="cube">
+              <a:avLst>
+                <a:gd name="adj" fmla="val 78110"/>
+              </a:avLst>
+            </a:prstGeom>
+          </p:spPr>
+          <p:style>
+            <a:lnRef idx="3">
+              <a:schemeClr val="lt1"/>
+            </a:lnRef>
+            <a:fillRef idx="1">
+              <a:schemeClr val="accent6"/>
+            </a:fillRef>
+            <a:effectRef idx="1">
+              <a:schemeClr val="accent6"/>
+            </a:effectRef>
+            <a:fontRef idx="minor">
+              <a:schemeClr val="lt1"/>
+            </a:fontRef>
+          </p:style>
+          <p:txBody>
+            <a:bodyPr rtlCol="0" anchor="ctr"/>
+            <a:lstStyle/>
+            <a:p>
+              <a:pPr algn="ctr"/>
+              <a:endParaRPr lang="de-DE" dirty="0"/>
+            </a:p>
+          </p:txBody>
+        </p:sp>
+      </p:grpSp>
+      <p:sp>
+        <p:nvSpPr>
+          <p:cNvPr id="50" name="Rechteck 49">
+            <a:extLst>
+              <a:ext uri="{FF2B5EF4-FFF2-40B4-BE49-F238E27FC236}">
+                <a16:creationId xmlns:a16="http://schemas.microsoft.com/office/drawing/2014/main" id="{78C3D6A7-5824-4E56-93F3-A2EC77E653C4}"/>
+              </a:ext>
+            </a:extLst>
+          </p:cNvPr>
+          <p:cNvSpPr/>
+          <p:nvPr/>
+        </p:nvSpPr>
+        <p:spPr>
+          <a:xfrm>
+            <a:off x="9378973" y="1028937"/>
+            <a:ext cx="2143627" cy="1660557"/>
+          </a:xfrm>
+          <a:prstGeom prst="rect">
+            <a:avLst/>
+          </a:prstGeom>
+        </p:spPr>
+        <p:style>
+          <a:lnRef idx="2">
+            <a:schemeClr val="accent5">
+              <a:shade val="50000"/>
+            </a:schemeClr>
+          </a:lnRef>
+          <a:fillRef idx="1">
+            <a:schemeClr val="accent5"/>
+          </a:fillRef>
+          <a:effectRef idx="0">
+            <a:schemeClr val="accent5"/>
+          </a:effectRef>
+          <a:fontRef idx="minor">
+            <a:schemeClr val="lt1"/>
+          </a:fontRef>
+        </p:style>
+        <p:txBody>
+          <a:bodyPr rtlCol="0" anchor="t"/>
+          <a:lstStyle/>
+          <a:p>
+            <a:pPr algn="ctr"/>
+            <a:r>
+              <a:rPr lang="de-DE" dirty="0"/>
+              <a:t>Server</a:t>
+            </a:r>
+          </a:p>
+          <a:p>
+            <a:pPr algn="ctr"/>
+            <a:r>
+              <a:rPr lang="de-DE" dirty="0" err="1"/>
+              <a:t>dev</a:t>
+            </a:r>
+            <a:endParaRPr lang="de-DE" dirty="0"/>
+          </a:p>
+          <a:p>
+            <a:pPr algn="ctr"/>
+            <a:r>
+              <a:rPr lang="de-DE" dirty="0"/>
+              <a:t>System</a:t>
+            </a:r>
+          </a:p>
+          <a:p>
+            <a:pPr algn="ctr"/>
+            <a:endParaRPr lang="de-DE" dirty="0"/>
+          </a:p>
+        </p:txBody>
+      </p:sp>
+      <p:grpSp>
+        <p:nvGrpSpPr>
+          <p:cNvPr id="51" name="Gruppieren 50">
+            <a:extLst>
+              <a:ext uri="{FF2B5EF4-FFF2-40B4-BE49-F238E27FC236}">
+                <a16:creationId xmlns:a16="http://schemas.microsoft.com/office/drawing/2014/main" id="{CB8ADD9A-536B-4683-94F0-5CADDEB0BA05}"/>
+              </a:ext>
+            </a:extLst>
+          </p:cNvPr>
+          <p:cNvGrpSpPr/>
+          <p:nvPr/>
+        </p:nvGrpSpPr>
+        <p:grpSpPr>
+          <a:xfrm>
+            <a:off x="10132119" y="1959272"/>
+            <a:ext cx="637333" cy="478943"/>
+            <a:chOff x="1985551" y="5904513"/>
+            <a:chExt cx="637333" cy="478943"/>
+          </a:xfrm>
+        </p:grpSpPr>
+        <p:sp>
+          <p:nvSpPr>
+            <p:cNvPr id="52" name="Würfel 51">
+              <a:extLst>
+                <a:ext uri="{FF2B5EF4-FFF2-40B4-BE49-F238E27FC236}">
+                  <a16:creationId xmlns:a16="http://schemas.microsoft.com/office/drawing/2014/main" id="{322A6634-30AB-4C58-AFF6-FFB997A5F07C}"/>
+                </a:ext>
+              </a:extLst>
+            </p:cNvPr>
+            <p:cNvSpPr/>
+            <p:nvPr/>
+          </p:nvSpPr>
+          <p:spPr>
+            <a:xfrm>
+              <a:off x="1985551" y="6104021"/>
+              <a:ext cx="637333" cy="279435"/>
+            </a:xfrm>
+            <a:prstGeom prst="cube">
+              <a:avLst>
+                <a:gd name="adj" fmla="val 78110"/>
+              </a:avLst>
+            </a:prstGeom>
+          </p:spPr>
+          <p:style>
+            <a:lnRef idx="3">
+              <a:schemeClr val="lt1"/>
+            </a:lnRef>
+            <a:fillRef idx="1">
+              <a:schemeClr val="accent6"/>
+            </a:fillRef>
+            <a:effectRef idx="1">
+              <a:schemeClr val="accent6"/>
+            </a:effectRef>
+            <a:fontRef idx="minor">
+              <a:schemeClr val="lt1"/>
+            </a:fontRef>
+          </p:style>
+          <p:txBody>
+            <a:bodyPr rtlCol="0" anchor="ctr"/>
+            <a:lstStyle/>
+            <a:p>
+              <a:pPr algn="ctr"/>
+              <a:endParaRPr lang="de-DE"/>
+            </a:p>
+          </p:txBody>
+        </p:sp>
+        <p:sp>
+          <p:nvSpPr>
+            <p:cNvPr id="53" name="Würfel 52">
+              <a:extLst>
+                <a:ext uri="{FF2B5EF4-FFF2-40B4-BE49-F238E27FC236}">
+                  <a16:creationId xmlns:a16="http://schemas.microsoft.com/office/drawing/2014/main" id="{56062E75-2571-452C-96F6-3AC1FE4847DF}"/>
+                </a:ext>
+              </a:extLst>
+            </p:cNvPr>
+            <p:cNvSpPr/>
+            <p:nvPr/>
+          </p:nvSpPr>
+          <p:spPr>
+            <a:xfrm>
+              <a:off x="1985551" y="6004267"/>
+              <a:ext cx="637333" cy="279435"/>
+            </a:xfrm>
+            <a:prstGeom prst="cube">
+              <a:avLst>
+                <a:gd name="adj" fmla="val 78110"/>
+              </a:avLst>
+            </a:prstGeom>
+          </p:spPr>
+          <p:style>
+            <a:lnRef idx="3">
+              <a:schemeClr val="lt1"/>
+            </a:lnRef>
+            <a:fillRef idx="1">
+              <a:schemeClr val="accent6"/>
+            </a:fillRef>
+            <a:effectRef idx="1">
+              <a:schemeClr val="accent6"/>
+            </a:effectRef>
+            <a:fontRef idx="minor">
+              <a:schemeClr val="lt1"/>
+            </a:fontRef>
+          </p:style>
+          <p:txBody>
+            <a:bodyPr rtlCol="0" anchor="ctr"/>
+            <a:lstStyle/>
+            <a:p>
+              <a:pPr algn="ctr"/>
+              <a:endParaRPr lang="de-DE"/>
+            </a:p>
+          </p:txBody>
+        </p:sp>
+        <p:sp>
+          <p:nvSpPr>
+            <p:cNvPr id="54" name="Würfel 53">
+              <a:extLst>
+                <a:ext uri="{FF2B5EF4-FFF2-40B4-BE49-F238E27FC236}">
+                  <a16:creationId xmlns:a16="http://schemas.microsoft.com/office/drawing/2014/main" id="{AFE21151-2224-43CE-AEE6-1D6E557DBE5A}"/>
+                </a:ext>
+              </a:extLst>
+            </p:cNvPr>
+            <p:cNvSpPr/>
+            <p:nvPr/>
+          </p:nvSpPr>
+          <p:spPr>
+            <a:xfrm>
+              <a:off x="1985551" y="5904513"/>
+              <a:ext cx="637333" cy="279435"/>
+            </a:xfrm>
+            <a:prstGeom prst="cube">
+              <a:avLst>
+                <a:gd name="adj" fmla="val 78110"/>
+              </a:avLst>
+            </a:prstGeom>
+          </p:spPr>
+          <p:style>
+            <a:lnRef idx="3">
+              <a:schemeClr val="lt1"/>
+            </a:lnRef>
+            <a:fillRef idx="1">
+              <a:schemeClr val="accent6"/>
+            </a:fillRef>
+            <a:effectRef idx="1">
+              <a:schemeClr val="accent6"/>
+            </a:effectRef>
+            <a:fontRef idx="minor">
+              <a:schemeClr val="lt1"/>
+            </a:fontRef>
+          </p:style>
+          <p:txBody>
+            <a:bodyPr rtlCol="0" anchor="ctr"/>
+            <a:lstStyle/>
+            <a:p>
+              <a:pPr algn="ctr"/>
+              <a:endParaRPr lang="de-DE"/>
+            </a:p>
+          </p:txBody>
+        </p:sp>
+      </p:grpSp>
+      <p:grpSp>
+        <p:nvGrpSpPr>
+          <p:cNvPr id="55" name="Gruppieren 54">
+            <a:extLst>
+              <a:ext uri="{FF2B5EF4-FFF2-40B4-BE49-F238E27FC236}">
+                <a16:creationId xmlns:a16="http://schemas.microsoft.com/office/drawing/2014/main" id="{ADF800BF-CD97-4473-9652-BE557C9F6C96}"/>
+              </a:ext>
+            </a:extLst>
+          </p:cNvPr>
+          <p:cNvGrpSpPr/>
+          <p:nvPr/>
+        </p:nvGrpSpPr>
+        <p:grpSpPr>
+          <a:xfrm>
+            <a:off x="7415686" y="4186475"/>
+            <a:ext cx="637333" cy="478943"/>
+            <a:chOff x="1985551" y="5904513"/>
+            <a:chExt cx="637333" cy="478943"/>
+          </a:xfrm>
+        </p:grpSpPr>
+        <p:sp>
+          <p:nvSpPr>
+            <p:cNvPr id="56" name="Würfel 55">
+              <a:extLst>
+                <a:ext uri="{FF2B5EF4-FFF2-40B4-BE49-F238E27FC236}">
+                  <a16:creationId xmlns:a16="http://schemas.microsoft.com/office/drawing/2014/main" id="{A62D0AFC-D581-4577-BB24-BD4211C855DC}"/>
+                </a:ext>
+              </a:extLst>
+            </p:cNvPr>
+            <p:cNvSpPr/>
+            <p:nvPr/>
+          </p:nvSpPr>
+          <p:spPr>
+            <a:xfrm>
+              <a:off x="1985551" y="6104021"/>
+              <a:ext cx="637333" cy="279435"/>
+            </a:xfrm>
+            <a:prstGeom prst="cube">
+              <a:avLst>
+                <a:gd name="adj" fmla="val 78110"/>
+              </a:avLst>
+            </a:prstGeom>
+          </p:spPr>
+          <p:style>
+            <a:lnRef idx="3">
+              <a:schemeClr val="lt1"/>
+            </a:lnRef>
+            <a:fillRef idx="1">
+              <a:schemeClr val="accent6"/>
+            </a:fillRef>
+            <a:effectRef idx="1">
+              <a:schemeClr val="accent6"/>
+            </a:effectRef>
+            <a:fontRef idx="minor">
+              <a:schemeClr val="lt1"/>
+            </a:fontRef>
+          </p:style>
+          <p:txBody>
+            <a:bodyPr rtlCol="0" anchor="ctr"/>
+            <a:lstStyle/>
+            <a:p>
+              <a:pPr algn="ctr"/>
+              <a:endParaRPr lang="de-DE"/>
+            </a:p>
+          </p:txBody>
+        </p:sp>
+        <p:sp>
+          <p:nvSpPr>
+            <p:cNvPr id="57" name="Würfel 56">
+              <a:extLst>
+                <a:ext uri="{FF2B5EF4-FFF2-40B4-BE49-F238E27FC236}">
+                  <a16:creationId xmlns:a16="http://schemas.microsoft.com/office/drawing/2014/main" id="{8C425E15-DF55-4FC5-A2FB-D63B4F5E700A}"/>
+                </a:ext>
+              </a:extLst>
+            </p:cNvPr>
+            <p:cNvSpPr/>
+            <p:nvPr/>
+          </p:nvSpPr>
+          <p:spPr>
+            <a:xfrm>
+              <a:off x="1985551" y="6004267"/>
+              <a:ext cx="637333" cy="279435"/>
+            </a:xfrm>
+            <a:prstGeom prst="cube">
+              <a:avLst>
+                <a:gd name="adj" fmla="val 78110"/>
+              </a:avLst>
+            </a:prstGeom>
+          </p:spPr>
+          <p:style>
+            <a:lnRef idx="3">
+              <a:schemeClr val="lt1"/>
+            </a:lnRef>
+            <a:fillRef idx="1">
+              <a:schemeClr val="accent6"/>
+            </a:fillRef>
+            <a:effectRef idx="1">
+              <a:schemeClr val="accent6"/>
+            </a:effectRef>
+            <a:fontRef idx="minor">
+              <a:schemeClr val="lt1"/>
+            </a:fontRef>
+          </p:style>
+          <p:txBody>
+            <a:bodyPr rtlCol="0" anchor="ctr"/>
+            <a:lstStyle/>
+            <a:p>
+              <a:pPr algn="ctr"/>
+              <a:endParaRPr lang="de-DE"/>
+            </a:p>
+          </p:txBody>
+        </p:sp>
+        <p:sp>
+          <p:nvSpPr>
+            <p:cNvPr id="58" name="Würfel 57">
+              <a:extLst>
+                <a:ext uri="{FF2B5EF4-FFF2-40B4-BE49-F238E27FC236}">
+                  <a16:creationId xmlns:a16="http://schemas.microsoft.com/office/drawing/2014/main" id="{15A675F2-5763-4863-9C76-25C40B0138EC}"/>
+                </a:ext>
+              </a:extLst>
+            </p:cNvPr>
+            <p:cNvSpPr/>
+            <p:nvPr/>
+          </p:nvSpPr>
+          <p:spPr>
+            <a:xfrm>
+              <a:off x="1985551" y="5904513"/>
+              <a:ext cx="637333" cy="279435"/>
+            </a:xfrm>
+            <a:prstGeom prst="cube">
+              <a:avLst>
+                <a:gd name="adj" fmla="val 78110"/>
+              </a:avLst>
+            </a:prstGeom>
+          </p:spPr>
+          <p:style>
+            <a:lnRef idx="3">
+              <a:schemeClr val="lt1"/>
+            </a:lnRef>
+            <a:fillRef idx="1">
+              <a:schemeClr val="accent6"/>
+            </a:fillRef>
+            <a:effectRef idx="1">
+              <a:schemeClr val="accent6"/>
+            </a:effectRef>
+            <a:fontRef idx="minor">
+              <a:schemeClr val="lt1"/>
+            </a:fontRef>
+          </p:style>
+          <p:txBody>
+            <a:bodyPr rtlCol="0" anchor="ctr"/>
+            <a:lstStyle/>
+            <a:p>
+              <a:pPr algn="ctr"/>
+              <a:endParaRPr lang="de-DE" dirty="0"/>
+            </a:p>
+          </p:txBody>
+        </p:sp>
+      </p:grpSp>
+      <p:sp>
+        <p:nvSpPr>
+          <p:cNvPr id="59" name="Pfeil: nach rechts 58">
+            <a:extLst>
+              <a:ext uri="{FF2B5EF4-FFF2-40B4-BE49-F238E27FC236}">
+                <a16:creationId xmlns:a16="http://schemas.microsoft.com/office/drawing/2014/main" id="{F998379B-160C-4C5D-A6C5-2FC0C39E9566}"/>
+              </a:ext>
+            </a:extLst>
+          </p:cNvPr>
+          <p:cNvSpPr/>
+          <p:nvPr/>
+        </p:nvSpPr>
+        <p:spPr>
+          <a:xfrm>
+            <a:off x="2859360" y="5359744"/>
+            <a:ext cx="1367871" cy="895633"/>
+          </a:xfrm>
+          <a:prstGeom prst="rightArrow">
+            <a:avLst/>
+          </a:prstGeom>
+        </p:spPr>
+        <p:style>
+          <a:lnRef idx="2">
+            <a:schemeClr val="accent1">
+              <a:shade val="50000"/>
+            </a:schemeClr>
+          </a:lnRef>
+          <a:fillRef idx="1">
+            <a:schemeClr val="accent1"/>
+          </a:fillRef>
+          <a:effectRef idx="0">
+            <a:schemeClr val="accent1"/>
+          </a:effectRef>
+          <a:fontRef idx="minor">
+            <a:schemeClr val="lt1"/>
+          </a:fontRef>
+        </p:style>
+        <p:txBody>
+          <a:bodyPr rtlCol="0" anchor="ctr"/>
+          <a:lstStyle/>
+          <a:p>
+            <a:pPr algn="ctr"/>
+            <a:r>
+              <a:rPr lang="de-DE" dirty="0" err="1"/>
+              <a:t>merge</a:t>
+            </a:r>
+            <a:r>
+              <a:rPr lang="de-DE" dirty="0"/>
+              <a:t> </a:t>
+            </a:r>
+            <a:r>
+              <a:rPr lang="de-DE" dirty="0" err="1"/>
+              <a:t>to</a:t>
+            </a:r>
+            <a:r>
+              <a:rPr lang="de-DE" dirty="0"/>
+              <a:t> </a:t>
+            </a:r>
+            <a:r>
+              <a:rPr lang="de-DE" dirty="0" err="1"/>
+              <a:t>master</a:t>
+            </a:r>
+            <a:endParaRPr lang="de-DE" dirty="0"/>
+          </a:p>
+        </p:txBody>
+      </p:sp>
+      <p:sp>
+        <p:nvSpPr>
+          <p:cNvPr id="49" name="Pfeil: nach rechts 48">
+            <a:extLst>
+              <a:ext uri="{FF2B5EF4-FFF2-40B4-BE49-F238E27FC236}">
+                <a16:creationId xmlns:a16="http://schemas.microsoft.com/office/drawing/2014/main" id="{44FFE09C-3A03-4046-B047-760B2B20403B}"/>
+              </a:ext>
+            </a:extLst>
+          </p:cNvPr>
+          <p:cNvSpPr/>
+          <p:nvPr/>
+        </p:nvSpPr>
+        <p:spPr>
+          <a:xfrm rot="16200000">
+            <a:off x="9844837" y="2776645"/>
+            <a:ext cx="1235243" cy="895633"/>
+          </a:xfrm>
+          <a:prstGeom prst="rightArrow">
+            <a:avLst/>
+          </a:prstGeom>
+        </p:spPr>
+        <p:style>
+          <a:lnRef idx="2">
+            <a:schemeClr val="accent1">
+              <a:shade val="50000"/>
+            </a:schemeClr>
+          </a:lnRef>
+          <a:fillRef idx="1">
+            <a:schemeClr val="accent1"/>
+          </a:fillRef>
+          <a:effectRef idx="0">
+            <a:schemeClr val="accent1"/>
+          </a:effectRef>
+          <a:fontRef idx="minor">
+            <a:schemeClr val="lt1"/>
+          </a:fontRef>
+        </p:style>
+        <p:txBody>
+          <a:bodyPr rtlCol="0" anchor="ctr"/>
+          <a:lstStyle/>
+          <a:p>
+            <a:pPr algn="ctr"/>
+            <a:r>
+              <a:rPr lang="de-DE" dirty="0"/>
+              <a:t>deploy</a:t>
+            </a:r>
+          </a:p>
+        </p:txBody>
+      </p:sp>
+      <p:sp>
+        <p:nvSpPr>
+          <p:cNvPr id="60" name="Gewitterblitz 59">
+            <a:extLst>
+              <a:ext uri="{FF2B5EF4-FFF2-40B4-BE49-F238E27FC236}">
+                <a16:creationId xmlns:a16="http://schemas.microsoft.com/office/drawing/2014/main" id="{B0131FE4-8675-46B8-ABFC-F98D1255F22F}"/>
+              </a:ext>
+            </a:extLst>
+          </p:cNvPr>
+          <p:cNvSpPr/>
+          <p:nvPr/>
+        </p:nvSpPr>
+        <p:spPr>
+          <a:xfrm rot="7333893">
+            <a:off x="5895477" y="3778978"/>
+            <a:ext cx="914400" cy="914400"/>
+          </a:xfrm>
+          <a:prstGeom prst="lightningBolt">
+            <a:avLst/>
+          </a:prstGeom>
+        </p:spPr>
+        <p:style>
+          <a:lnRef idx="2">
+            <a:schemeClr val="accent1">
+              <a:shade val="50000"/>
+            </a:schemeClr>
+          </a:lnRef>
+          <a:fillRef idx="1">
+            <a:schemeClr val="accent1"/>
+          </a:fillRef>
+          <a:effectRef idx="0">
+            <a:schemeClr val="accent1"/>
+          </a:effectRef>
+          <a:fontRef idx="minor">
+            <a:schemeClr val="lt1"/>
+          </a:fontRef>
+        </p:style>
+        <p:txBody>
+          <a:bodyPr rtlCol="0" anchor="ctr"/>
+          <a:lstStyle/>
+          <a:p>
+            <a:pPr algn="ctr"/>
+            <a:endParaRPr lang="de-DE" dirty="0"/>
+          </a:p>
+        </p:txBody>
+      </p:sp>
+      <p:sp>
+        <p:nvSpPr>
+          <p:cNvPr id="61" name="Pfeil: nach rechts 60">
+            <a:extLst>
+              <a:ext uri="{FF2B5EF4-FFF2-40B4-BE49-F238E27FC236}">
+                <a16:creationId xmlns:a16="http://schemas.microsoft.com/office/drawing/2014/main" id="{1C4D0BD3-046D-4C92-959D-FB88011932A2}"/>
+              </a:ext>
+            </a:extLst>
+          </p:cNvPr>
+          <p:cNvSpPr/>
+          <p:nvPr/>
+        </p:nvSpPr>
+        <p:spPr>
+          <a:xfrm>
+            <a:off x="8378593" y="4344604"/>
+            <a:ext cx="1367871" cy="280852"/>
+          </a:xfrm>
+          <a:prstGeom prst="rightArrow">
+            <a:avLst/>
+          </a:prstGeom>
+        </p:spPr>
+        <p:style>
+          <a:lnRef idx="2">
+            <a:schemeClr val="accent1">
+              <a:shade val="50000"/>
+            </a:schemeClr>
+          </a:lnRef>
+          <a:fillRef idx="1">
+            <a:schemeClr val="accent1"/>
+          </a:fillRef>
+          <a:effectRef idx="0">
+            <a:schemeClr val="accent1"/>
+          </a:effectRef>
+          <a:fontRef idx="minor">
+            <a:schemeClr val="lt1"/>
+          </a:fontRef>
+        </p:style>
+        <p:txBody>
+          <a:bodyPr rtlCol="0" anchor="ctr"/>
+          <a:lstStyle/>
+          <a:p>
+            <a:pPr algn="ctr"/>
+            <a:endParaRPr lang="de-DE" dirty="0"/>
+          </a:p>
+        </p:txBody>
+      </p:sp>
+      <p:grpSp>
+        <p:nvGrpSpPr>
+          <p:cNvPr id="63" name="Gruppieren 62">
+            <a:extLst>
+              <a:ext uri="{FF2B5EF4-FFF2-40B4-BE49-F238E27FC236}">
+                <a16:creationId xmlns:a16="http://schemas.microsoft.com/office/drawing/2014/main" id="{DA38BC18-48C7-483B-9ACF-D49DA12BD658}"/>
+              </a:ext>
+            </a:extLst>
+          </p:cNvPr>
+          <p:cNvGrpSpPr/>
+          <p:nvPr/>
+        </p:nvGrpSpPr>
+        <p:grpSpPr>
+          <a:xfrm>
+            <a:off x="10105367" y="5350120"/>
+            <a:ext cx="637333" cy="478943"/>
+            <a:chOff x="1985551" y="5904513"/>
+            <a:chExt cx="637333" cy="478943"/>
+          </a:xfrm>
+        </p:grpSpPr>
+        <p:sp>
+          <p:nvSpPr>
+            <p:cNvPr id="64" name="Würfel 63">
+              <a:extLst>
+                <a:ext uri="{FF2B5EF4-FFF2-40B4-BE49-F238E27FC236}">
+                  <a16:creationId xmlns:a16="http://schemas.microsoft.com/office/drawing/2014/main" id="{14A76F6C-6D21-4CB0-90A9-AC21B33DFA8B}"/>
+                </a:ext>
+              </a:extLst>
+            </p:cNvPr>
+            <p:cNvSpPr/>
+            <p:nvPr/>
+          </p:nvSpPr>
+          <p:spPr>
+            <a:xfrm>
+              <a:off x="1985551" y="6104021"/>
+              <a:ext cx="637333" cy="279435"/>
+            </a:xfrm>
+            <a:prstGeom prst="cube">
+              <a:avLst>
+                <a:gd name="adj" fmla="val 78110"/>
+              </a:avLst>
+            </a:prstGeom>
+          </p:spPr>
+          <p:style>
+            <a:lnRef idx="3">
+              <a:schemeClr val="lt1"/>
+            </a:lnRef>
+            <a:fillRef idx="1">
+              <a:schemeClr val="accent6"/>
+            </a:fillRef>
+            <a:effectRef idx="1">
+              <a:schemeClr val="accent6"/>
+            </a:effectRef>
+            <a:fontRef idx="minor">
+              <a:schemeClr val="lt1"/>
+            </a:fontRef>
+          </p:style>
+          <p:txBody>
+            <a:bodyPr rtlCol="0" anchor="ctr"/>
+            <a:lstStyle/>
+            <a:p>
+              <a:pPr algn="ctr"/>
+              <a:endParaRPr lang="de-DE"/>
+            </a:p>
+          </p:txBody>
+        </p:sp>
+        <p:sp>
+          <p:nvSpPr>
+            <p:cNvPr id="65" name="Würfel 64">
+              <a:extLst>
+                <a:ext uri="{FF2B5EF4-FFF2-40B4-BE49-F238E27FC236}">
+                  <a16:creationId xmlns:a16="http://schemas.microsoft.com/office/drawing/2014/main" id="{8D786320-5A03-4CAF-94DB-0A2DA525FD04}"/>
+                </a:ext>
+              </a:extLst>
+            </p:cNvPr>
+            <p:cNvSpPr/>
+            <p:nvPr/>
+          </p:nvSpPr>
+          <p:spPr>
+            <a:xfrm>
+              <a:off x="1985551" y="6004267"/>
+              <a:ext cx="637333" cy="279435"/>
+            </a:xfrm>
+            <a:prstGeom prst="cube">
+              <a:avLst>
+                <a:gd name="adj" fmla="val 78110"/>
+              </a:avLst>
+            </a:prstGeom>
+          </p:spPr>
+          <p:style>
+            <a:lnRef idx="3">
+              <a:schemeClr val="lt1"/>
+            </a:lnRef>
+            <a:fillRef idx="1">
+              <a:schemeClr val="accent6"/>
+            </a:fillRef>
+            <a:effectRef idx="1">
+              <a:schemeClr val="accent6"/>
+            </a:effectRef>
+            <a:fontRef idx="minor">
+              <a:schemeClr val="lt1"/>
+            </a:fontRef>
+          </p:style>
+          <p:txBody>
+            <a:bodyPr rtlCol="0" anchor="ctr"/>
+            <a:lstStyle/>
+            <a:p>
+              <a:pPr algn="ctr"/>
+              <a:endParaRPr lang="de-DE"/>
+            </a:p>
+          </p:txBody>
+        </p:sp>
+        <p:sp>
+          <p:nvSpPr>
+            <p:cNvPr id="66" name="Würfel 65">
+              <a:extLst>
+                <a:ext uri="{FF2B5EF4-FFF2-40B4-BE49-F238E27FC236}">
+                  <a16:creationId xmlns:a16="http://schemas.microsoft.com/office/drawing/2014/main" id="{22DED509-DBCB-4629-86F6-E230565AA71E}"/>
+                </a:ext>
+              </a:extLst>
+            </p:cNvPr>
+            <p:cNvSpPr/>
+            <p:nvPr/>
+          </p:nvSpPr>
+          <p:spPr>
+            <a:xfrm>
+              <a:off x="1985551" y="5904513"/>
+              <a:ext cx="637333" cy="279435"/>
+            </a:xfrm>
+            <a:prstGeom prst="cube">
+              <a:avLst>
+                <a:gd name="adj" fmla="val 78110"/>
+              </a:avLst>
+            </a:prstGeom>
+          </p:spPr>
+          <p:style>
+            <a:lnRef idx="3">
+              <a:schemeClr val="lt1"/>
+            </a:lnRef>
+            <a:fillRef idx="1">
+              <a:schemeClr val="accent6"/>
+            </a:fillRef>
+            <a:effectRef idx="1">
+              <a:schemeClr val="accent6"/>
+            </a:effectRef>
+            <a:fontRef idx="minor">
+              <a:schemeClr val="lt1"/>
+            </a:fontRef>
+          </p:style>
+          <p:txBody>
+            <a:bodyPr rtlCol="0" anchor="ctr"/>
+            <a:lstStyle/>
+            <a:p>
+              <a:pPr algn="ctr"/>
+              <a:endParaRPr lang="de-DE" dirty="0"/>
+            </a:p>
+          </p:txBody>
+        </p:sp>
+      </p:grpSp>
+    </p:spTree>
+    <p:extLst>
+      <p:ext uri="{BB962C8B-B14F-4D97-AF65-F5344CB8AC3E}">
+        <p14:creationId xmlns:p14="http://schemas.microsoft.com/office/powerpoint/2010/main" val="1543614632"/>
+      </p:ext>
+    </p:extLst>
+  </p:cSld>
+  <p:clrMapOvr>
+    <a:masterClrMapping/>
+  </p:clrMapOvr>
+</p:sld>
+</file>
+
 <file path=ppt/slides/slide2.xml><?xml version="1.0" encoding="utf-8"?>
 <p:sld xmlns:a="http://schemas.openxmlformats.org/drawingml/2006/main" xmlns:r="http://schemas.openxmlformats.org/officeDocument/2006/relationships" xmlns:p="http://schemas.openxmlformats.org/presentationml/2006/main">
   <p:cSld>
@@ -4435,7 +6374,7 @@
           <a:p>
             <a:r>
               <a:rPr lang="de-DE" dirty="0"/>
-              <a:t>Entwickeln mit und Docker</a:t>
+              <a:t>Entwickeln mit Docker</a:t>
             </a:r>
           </a:p>
           <a:p>

</xml_diff>